<commit_message>
1. ppt 수정 2. elasticsearch 옵션 주석 추가
</commit_message>
<xml_diff>
--- a/99.ppt/[Ch4-7. 결제 서비스 구현.pptx
+++ b/99.ppt/[Ch4-7. 결제 서비스 구현.pptx
@@ -18,11 +18,11 @@
     <p:sldId id="343" r:id="rId9"/>
     <p:sldId id="344" r:id="rId10"/>
     <p:sldId id="315" r:id="rId11"/>
-    <p:sldId id="349" r:id="rId12"/>
-    <p:sldId id="348" r:id="rId13"/>
+    <p:sldId id="348" r:id="rId12"/>
+    <p:sldId id="349" r:id="rId13"/>
     <p:sldId id="350" r:id="rId14"/>
-    <p:sldId id="347" r:id="rId15"/>
-    <p:sldId id="346" r:id="rId16"/>
+    <p:sldId id="346" r:id="rId15"/>
+    <p:sldId id="347" r:id="rId16"/>
     <p:sldId id="353" r:id="rId17"/>
     <p:sldId id="264" r:id="rId18"/>
     <p:sldId id="355" r:id="rId19"/>
@@ -235,7 +235,7 @@
           <a:p>
             <a:fld id="{9B770909-2C76-4DF9-BB76-4EE283593418}" type="datetimeFigureOut">
               <a:rPr lang="ko-KR" altLang="en-US" smtClean="0"/>
-              <a:t>2023-10-12</a:t>
+              <a:t>2023-10-13</a:t>
             </a:fld>
             <a:endParaRPr lang="ko-KR" altLang="en-US"/>
           </a:p>
@@ -936,7 +936,7 @@
     </p:spTree>
     <p:extLst>
       <p:ext uri="{BB962C8B-B14F-4D97-AF65-F5344CB8AC3E}">
-        <p14:creationId xmlns:p14="http://schemas.microsoft.com/office/powerpoint/2010/main" val="741720168"/>
+        <p14:creationId xmlns:p14="http://schemas.microsoft.com/office/powerpoint/2010/main" val="1323937303"/>
       </p:ext>
     </p:extLst>
   </p:cSld>
@@ -1020,7 +1020,7 @@
     </p:spTree>
     <p:extLst>
       <p:ext uri="{BB962C8B-B14F-4D97-AF65-F5344CB8AC3E}">
-        <p14:creationId xmlns:p14="http://schemas.microsoft.com/office/powerpoint/2010/main" val="1323937303"/>
+        <p14:creationId xmlns:p14="http://schemas.microsoft.com/office/powerpoint/2010/main" val="741720168"/>
       </p:ext>
     </p:extLst>
   </p:cSld>
@@ -1200,7 +1200,7 @@
     </p:spTree>
     <p:extLst>
       <p:ext uri="{BB962C8B-B14F-4D97-AF65-F5344CB8AC3E}">
-        <p14:creationId xmlns:p14="http://schemas.microsoft.com/office/powerpoint/2010/main" val="2032762576"/>
+        <p14:creationId xmlns:p14="http://schemas.microsoft.com/office/powerpoint/2010/main" val="291635600"/>
       </p:ext>
     </p:extLst>
   </p:cSld>
@@ -1254,6 +1254,119 @@
           <a:bodyPr/>
           <a:lstStyle/>
           <a:p>
+            <a:pPr>
+              <a:buFont typeface="Arial" panose="020B0604020202020204" pitchFamily="34" charset="0"/>
+              <a:buChar char="•"/>
+            </a:pPr>
+            <a:r>
+              <a:rPr lang="ko-KR" altLang="en-US" dirty="0"/>
+              <a:t>하루 </a:t>
+            </a:r>
+            <a:r>
+              <a:rPr lang="en-US" altLang="ko-KR" dirty="0"/>
+              <a:t>100</a:t>
+            </a:r>
+            <a:r>
+              <a:rPr lang="ko-KR" altLang="en-US" dirty="0" err="1"/>
+              <a:t>만건의</a:t>
+            </a:r>
+            <a:r>
+              <a:rPr lang="ko-KR" altLang="en-US" dirty="0"/>
+              <a:t> 결재가 발생한다</a:t>
+            </a:r>
+            <a:r>
+              <a:rPr lang="en-US" altLang="ko-KR" dirty="0"/>
+              <a:t>. TPS </a:t>
+            </a:r>
+            <a:r>
+              <a:rPr lang="ko-KR" altLang="en-US" dirty="0"/>
+              <a:t>는 </a:t>
+            </a:r>
+            <a:r>
+              <a:rPr lang="en-US" altLang="ko-KR" dirty="0"/>
+              <a:t>? </a:t>
+            </a:r>
+          </a:p>
+          <a:p>
+            <a:pPr marL="742950" lvl="1" indent="-285750">
+              <a:buFont typeface="Arial" panose="020B0604020202020204" pitchFamily="34" charset="0"/>
+              <a:buChar char="•"/>
+            </a:pPr>
+            <a:r>
+              <a:rPr lang="en-US" altLang="ko-KR" dirty="0"/>
+              <a:t>1,000,000 / 100,000 = </a:t>
+            </a:r>
+            <a:r>
+              <a:rPr lang="ko-KR" altLang="en-US" dirty="0"/>
+              <a:t>약 </a:t>
+            </a:r>
+            <a:r>
+              <a:rPr lang="en-US" altLang="ko-KR" dirty="0"/>
+              <a:t>10 TPS </a:t>
+            </a:r>
+          </a:p>
+          <a:p>
+            <a:pPr marL="1143000" lvl="2" indent="-228600">
+              <a:buFont typeface="Arial" panose="020B0604020202020204" pitchFamily="34" charset="0"/>
+              <a:buChar char="•"/>
+            </a:pPr>
+            <a:r>
+              <a:rPr lang="en-US" altLang="ko-KR" dirty="0"/>
+              <a:t>1,000,000 / (24</a:t>
+            </a:r>
+            <a:r>
+              <a:rPr lang="ko-KR" altLang="en-US" dirty="0"/>
+              <a:t>시간 * </a:t>
+            </a:r>
+            <a:r>
+              <a:rPr lang="en-US" altLang="ko-KR" dirty="0"/>
+              <a:t>60</a:t>
+            </a:r>
+            <a:r>
+              <a:rPr lang="ko-KR" altLang="en-US" dirty="0"/>
+              <a:t>분 * </a:t>
+            </a:r>
+            <a:r>
+              <a:rPr lang="en-US" altLang="ko-KR" dirty="0"/>
+              <a:t>60</a:t>
+            </a:r>
+            <a:r>
+              <a:rPr lang="ko-KR" altLang="en-US" dirty="0"/>
+              <a:t>초</a:t>
+            </a:r>
+            <a:r>
+              <a:rPr lang="en-US" altLang="ko-KR" dirty="0"/>
+              <a:t>) = 1,000,000 / 86,400 = 11.57 TPS</a:t>
+            </a:r>
+          </a:p>
+          <a:p>
+            <a:pPr marL="742950" lvl="1" indent="-285750">
+              <a:buFont typeface="Arial" panose="020B0604020202020204" pitchFamily="34" charset="0"/>
+              <a:buChar char="•"/>
+            </a:pPr>
+            <a:r>
+              <a:rPr lang="ko-KR" altLang="en-US" dirty="0"/>
+              <a:t>서울시 일평균 택시 결제건수 </a:t>
+            </a:r>
+            <a:r>
+              <a:rPr lang="en-US" altLang="ko-KR" dirty="0"/>
+              <a:t>= 800,000 → 9.26 TPS </a:t>
+            </a:r>
+          </a:p>
+          <a:p>
+            <a:pPr marL="1143000" lvl="2" indent="-228600">
+              <a:buFont typeface="Arial" panose="020B0604020202020204" pitchFamily="34" charset="0"/>
+              <a:buChar char="•"/>
+            </a:pPr>
+            <a:r>
+              <a:rPr lang="en-US" altLang="ko-KR" dirty="0">
+                <a:hlinkClick r:id="rId3"/>
+              </a:rPr>
+              <a:t>https://news.seoul.go.kr/traffic/archives/307</a:t>
+            </a:r>
+            <a:endParaRPr lang="ko-KR" altLang="en-US"/>
+          </a:p>
+          <a:p>
             <a:endParaRPr lang="en-US" altLang="ko-KR" dirty="0"/>
           </a:p>
         </p:txBody>
@@ -1284,7 +1397,7 @@
     </p:spTree>
     <p:extLst>
       <p:ext uri="{BB962C8B-B14F-4D97-AF65-F5344CB8AC3E}">
-        <p14:creationId xmlns:p14="http://schemas.microsoft.com/office/powerpoint/2010/main" val="291635600"/>
+        <p14:creationId xmlns:p14="http://schemas.microsoft.com/office/powerpoint/2010/main" val="2032762576"/>
       </p:ext>
     </p:extLst>
   </p:cSld>
@@ -1353,12 +1466,13 @@
           <a:p>
             <a:r>
               <a:rPr lang="ko-KR" altLang="en-US" dirty="0"/>
-              <a:t>지금부터는 결제 서비스를 구현해 보겠습니다</a:t>
-            </a:r>
-            <a:r>
-              <a:rPr lang="en-US" altLang="ko-KR" dirty="0"/>
+              <a:t>지금부터는 결제 서비스를 구현환경을 세팅해 보겠습니다</a:t>
+            </a:r>
+            <a:r>
+              <a:rPr lang="en-US" altLang="ko-KR"/>
               <a:t>.</a:t>
             </a:r>
+            <a:endParaRPr lang="en-US" altLang="ko-KR" dirty="0"/>
           </a:p>
         </p:txBody>
       </p:sp>
@@ -7985,218 +8099,6 @@
       </p:grpSpPr>
       <p:sp>
         <p:nvSpPr>
-          <p:cNvPr id="7" name="Google Shape;209;p30">
-            <a:extLst>
-              <a:ext uri="{FF2B5EF4-FFF2-40B4-BE49-F238E27FC236}">
-                <a16:creationId xmlns:a16="http://schemas.microsoft.com/office/drawing/2014/main" id="{35F3E219-4EBB-8DE8-0966-E4317399395E}"/>
-              </a:ext>
-            </a:extLst>
-          </p:cNvPr>
-          <p:cNvSpPr/>
-          <p:nvPr/>
-        </p:nvSpPr>
-        <p:spPr>
-          <a:xfrm>
-            <a:off x="7811013" y="528014"/>
-            <a:ext cx="952500" cy="298200"/>
-          </a:xfrm>
-          <a:prstGeom prst="rect">
-            <a:avLst/>
-          </a:prstGeom>
-          <a:noFill/>
-          <a:ln>
-            <a:noFill/>
-          </a:ln>
-        </p:spPr>
-        <p:txBody>
-          <a:bodyPr spcFirstLastPara="1" wrap="square" lIns="19050" tIns="19050" rIns="19050" bIns="19050" anchor="t" anchorCtr="0">
-            <a:noAutofit/>
-          </a:bodyPr>
-          <a:lstStyle/>
-          <a:p>
-            <a:pPr marL="63500" marR="0" lvl="1" indent="0" algn="l" rtl="0">
-              <a:lnSpc>
-                <a:spcPct val="90000"/>
-              </a:lnSpc>
-              <a:spcBef>
-                <a:spcPts val="0"/>
-              </a:spcBef>
-              <a:spcAft>
-                <a:spcPts val="0"/>
-              </a:spcAft>
-              <a:buNone/>
-            </a:pPr>
-            <a:r>
-              <a:rPr lang="en-US" altLang="ko" sz="1200" b="1" i="0" u="none" strike="noStrike" cap="none" dirty="0">
-                <a:solidFill>
-                  <a:schemeClr val="bg1"/>
-                </a:solidFill>
-                <a:latin typeface="Arial"/>
-                <a:ea typeface="Arial"/>
-                <a:cs typeface="Arial"/>
-                <a:sym typeface="Arial"/>
-              </a:rPr>
-              <a:t>3</a:t>
-            </a:r>
-            <a:r>
-              <a:rPr lang="ko" sz="1200" b="1" i="0" u="none" strike="noStrike" cap="none" dirty="0">
-                <a:solidFill>
-                  <a:schemeClr val="bg1"/>
-                </a:solidFill>
-                <a:latin typeface="Arial"/>
-                <a:ea typeface="Arial"/>
-                <a:cs typeface="Arial"/>
-                <a:sym typeface="Arial"/>
-              </a:rPr>
-              <a:t>.</a:t>
-            </a:r>
-            <a:endParaRPr sz="500" dirty="0">
-              <a:solidFill>
-                <a:schemeClr val="bg1"/>
-              </a:solidFill>
-            </a:endParaRPr>
-          </a:p>
-        </p:txBody>
-      </p:sp>
-      <p:sp>
-        <p:nvSpPr>
-          <p:cNvPr id="8" name="Google Shape;210;p30">
-            <a:extLst>
-              <a:ext uri="{FF2B5EF4-FFF2-40B4-BE49-F238E27FC236}">
-                <a16:creationId xmlns:a16="http://schemas.microsoft.com/office/drawing/2014/main" id="{8CB63A74-B5C7-DCAA-53F5-96E44004D694}"/>
-              </a:ext>
-            </a:extLst>
-          </p:cNvPr>
-          <p:cNvSpPr/>
-          <p:nvPr/>
-        </p:nvSpPr>
-        <p:spPr>
-          <a:xfrm>
-            <a:off x="7811013" y="825047"/>
-            <a:ext cx="952500" cy="293400"/>
-          </a:xfrm>
-          <a:prstGeom prst="rect">
-            <a:avLst/>
-          </a:prstGeom>
-          <a:noFill/>
-          <a:ln>
-            <a:noFill/>
-          </a:ln>
-        </p:spPr>
-        <p:txBody>
-          <a:bodyPr spcFirstLastPara="1" wrap="square" lIns="19050" tIns="19050" rIns="19050" bIns="19050" anchor="t" anchorCtr="0">
-            <a:noAutofit/>
-          </a:bodyPr>
-          <a:lstStyle/>
-          <a:p>
-            <a:pPr marL="63500" marR="0" lvl="1" indent="0" algn="l" rtl="0">
-              <a:spcBef>
-                <a:spcPts val="200"/>
-              </a:spcBef>
-              <a:spcAft>
-                <a:spcPts val="0"/>
-              </a:spcAft>
-              <a:buClr>
-                <a:srgbClr val="000000"/>
-              </a:buClr>
-              <a:buFont typeface="Arial"/>
-              <a:buNone/>
-            </a:pPr>
-            <a:r>
-              <a:rPr lang="ko-KR" altLang="en-US" sz="800" dirty="0">
-                <a:solidFill>
-                  <a:schemeClr val="bg1"/>
-                </a:solidFill>
-              </a:rPr>
-              <a:t>결제 서비스 설계</a:t>
-            </a:r>
-            <a:endParaRPr sz="800" dirty="0">
-              <a:solidFill>
-                <a:schemeClr val="bg1"/>
-              </a:solidFill>
-            </a:endParaRPr>
-          </a:p>
-        </p:txBody>
-      </p:sp>
-      <p:pic>
-        <p:nvPicPr>
-          <p:cNvPr id="2050" name="Picture 2">
-            <a:extLst>
-              <a:ext uri="{FF2B5EF4-FFF2-40B4-BE49-F238E27FC236}">
-                <a16:creationId xmlns:a16="http://schemas.microsoft.com/office/drawing/2014/main" id="{097DC857-FB21-CE89-813F-C206CE4D7B14}"/>
-              </a:ext>
-            </a:extLst>
-          </p:cNvPr>
-          <p:cNvPicPr>
-            <a:picLocks noChangeAspect="1" noChangeArrowheads="1"/>
-          </p:cNvPicPr>
-          <p:nvPr/>
-        </p:nvPicPr>
-        <p:blipFill>
-          <a:blip r:embed="rId3">
-            <a:extLst>
-              <a:ext uri="{28A0092B-C50C-407E-A947-70E740481C1C}">
-                <a14:useLocalDpi xmlns:a14="http://schemas.microsoft.com/office/drawing/2010/main" val="0"/>
-              </a:ext>
-            </a:extLst>
-          </a:blip>
-          <a:srcRect/>
-          <a:stretch>
-            <a:fillRect/>
-          </a:stretch>
-        </p:blipFill>
-        <p:spPr bwMode="auto">
-          <a:xfrm>
-            <a:off x="1573213" y="0"/>
-            <a:ext cx="5997575" cy="5143500"/>
-          </a:xfrm>
-          <a:prstGeom prst="rect">
-            <a:avLst/>
-          </a:prstGeom>
-          <a:noFill/>
-          <a:extLst>
-            <a:ext uri="{909E8E84-426E-40DD-AFC4-6F175D3DCCD1}">
-              <a14:hiddenFill xmlns:a14="http://schemas.microsoft.com/office/drawing/2010/main">
-                <a:solidFill>
-                  <a:srgbClr val="FFFFFF"/>
-                </a:solidFill>
-              </a14:hiddenFill>
-            </a:ext>
-          </a:extLst>
-        </p:spPr>
-      </p:pic>
-    </p:spTree>
-    <p:extLst>
-      <p:ext uri="{BB962C8B-B14F-4D97-AF65-F5344CB8AC3E}">
-        <p14:creationId xmlns:p14="http://schemas.microsoft.com/office/powerpoint/2010/main" val="1621025704"/>
-      </p:ext>
-    </p:extLst>
-  </p:cSld>
-  <p:clrMapOvr>
-    <a:masterClrMapping/>
-  </p:clrMapOvr>
-</p:sld>
-</file>
-
-<file path=ppt/slides/slide12.xml><?xml version="1.0" encoding="utf-8"?>
-<p:sld xmlns:a="http://schemas.openxmlformats.org/drawingml/2006/main" xmlns:r="http://schemas.openxmlformats.org/officeDocument/2006/relationships" xmlns:p="http://schemas.openxmlformats.org/presentationml/2006/main">
-  <p:cSld>
-    <p:spTree>
-      <p:nvGrpSpPr>
-        <p:cNvPr id="1" name=""/>
-        <p:cNvGrpSpPr/>
-        <p:nvPr/>
-      </p:nvGrpSpPr>
-      <p:grpSpPr>
-        <a:xfrm>
-          <a:off x="0" y="0"/>
-          <a:ext cx="0" cy="0"/>
-          <a:chOff x="0" y="0"/>
-          <a:chExt cx="0" cy="0"/>
-        </a:xfrm>
-      </p:grpSpPr>
-      <p:sp>
-        <p:nvSpPr>
           <p:cNvPr id="2" name="제목 1">
             <a:extLst>
               <a:ext uri="{FF2B5EF4-FFF2-40B4-BE49-F238E27FC236}">
@@ -8419,97 +8321,7 @@
 </p:sld>
 </file>
 
-<file path=ppt/slides/slide13.xml><?xml version="1.0" encoding="utf-8"?>
-<p:sld xmlns:a="http://schemas.openxmlformats.org/drawingml/2006/main" xmlns:r="http://schemas.openxmlformats.org/officeDocument/2006/relationships" xmlns:p="http://schemas.openxmlformats.org/presentationml/2006/main">
-  <p:cSld>
-    <p:spTree>
-      <p:nvGrpSpPr>
-        <p:cNvPr id="1" name=""/>
-        <p:cNvGrpSpPr/>
-        <p:nvPr/>
-      </p:nvGrpSpPr>
-      <p:grpSpPr>
-        <a:xfrm>
-          <a:off x="0" y="0"/>
-          <a:ext cx="0" cy="0"/>
-          <a:chOff x="0" y="0"/>
-          <a:chExt cx="0" cy="0"/>
-        </a:xfrm>
-      </p:grpSpPr>
-      <p:sp>
-        <p:nvSpPr>
-          <p:cNvPr id="4" name="제목 3">
-            <a:extLst>
-              <a:ext uri="{FF2B5EF4-FFF2-40B4-BE49-F238E27FC236}">
-                <a16:creationId xmlns:a16="http://schemas.microsoft.com/office/drawing/2014/main" id="{AA6C3C0E-F24F-9763-AC2A-545FB7F3873E}"/>
-              </a:ext>
-            </a:extLst>
-          </p:cNvPr>
-          <p:cNvSpPr>
-            <a:spLocks noGrp="1"/>
-          </p:cNvSpPr>
-          <p:nvPr>
-            <p:ph type="ctrTitle"/>
-          </p:nvPr>
-        </p:nvSpPr>
-        <p:spPr/>
-        <p:txBody>
-          <a:bodyPr/>
-          <a:lstStyle/>
-          <a:p>
-            <a:r>
-              <a:rPr lang="ko-KR" altLang="en-US" dirty="0"/>
-              <a:t>결제 서비스 설계</a:t>
-            </a:r>
-          </a:p>
-        </p:txBody>
-      </p:sp>
-      <p:sp>
-        <p:nvSpPr>
-          <p:cNvPr id="5" name="부제목 4">
-            <a:extLst>
-              <a:ext uri="{FF2B5EF4-FFF2-40B4-BE49-F238E27FC236}">
-                <a16:creationId xmlns:a16="http://schemas.microsoft.com/office/drawing/2014/main" id="{CAF74D28-A379-C9BB-D8F9-E3B6A7427E89}"/>
-              </a:ext>
-            </a:extLst>
-          </p:cNvPr>
-          <p:cNvSpPr>
-            <a:spLocks noGrp="1"/>
-          </p:cNvSpPr>
-          <p:nvPr>
-            <p:ph type="subTitle" idx="1"/>
-          </p:nvPr>
-        </p:nvSpPr>
-        <p:spPr/>
-        <p:txBody>
-          <a:bodyPr/>
-          <a:lstStyle/>
-          <a:p>
-            <a:pPr marL="0" indent="0" algn="r">
-              <a:buNone/>
-            </a:pPr>
-            <a:r>
-              <a:rPr lang="en-US" altLang="ko-KR" dirty="0"/>
-              <a:t>System Design</a:t>
-            </a:r>
-            <a:endParaRPr lang="ko-KR" altLang="en-US" dirty="0"/>
-          </a:p>
-        </p:txBody>
-      </p:sp>
-    </p:spTree>
-    <p:extLst>
-      <p:ext uri="{BB962C8B-B14F-4D97-AF65-F5344CB8AC3E}">
-        <p14:creationId xmlns:p14="http://schemas.microsoft.com/office/powerpoint/2010/main" val="3123472479"/>
-      </p:ext>
-    </p:extLst>
-  </p:cSld>
-  <p:clrMapOvr>
-    <a:masterClrMapping/>
-  </p:clrMapOvr>
-</p:sld>
-</file>
-
-<file path=ppt/slides/slide14.xml><?xml version="1.0" encoding="utf-8"?>
+<file path=ppt/slides/slide12.xml><?xml version="1.0" encoding="utf-8"?>
 <p:sld xmlns:a="http://schemas.openxmlformats.org/drawingml/2006/main" xmlns:r="http://schemas.openxmlformats.org/officeDocument/2006/relationships" xmlns:p="http://schemas.openxmlformats.org/presentationml/2006/main">
   <p:cSld>
     <p:spTree>
@@ -8661,10 +8473,57 @@
           </a:p>
         </p:txBody>
       </p:sp>
+      <p:pic>
+        <p:nvPicPr>
+          <p:cNvPr id="2" name="Picture 2">
+            <a:extLst>
+              <a:ext uri="{FF2B5EF4-FFF2-40B4-BE49-F238E27FC236}">
+                <a16:creationId xmlns:a16="http://schemas.microsoft.com/office/drawing/2014/main" id="{F7CED50E-5751-244B-0801-29898AF7ADFD}"/>
+              </a:ext>
+            </a:extLst>
+          </p:cNvPr>
+          <p:cNvPicPr>
+            <a:picLocks noChangeAspect="1" noChangeArrowheads="1"/>
+          </p:cNvPicPr>
+          <p:nvPr/>
+        </p:nvPicPr>
+        <p:blipFill>
+          <a:blip r:embed="rId3">
+            <a:extLst>
+              <a:ext uri="{28A0092B-C50C-407E-A947-70E740481C1C}">
+                <a14:useLocalDpi xmlns:a14="http://schemas.microsoft.com/office/drawing/2010/main" val="0"/>
+              </a:ext>
+            </a:extLst>
+          </a:blip>
+          <a:srcRect/>
+          <a:stretch>
+            <a:fillRect/>
+          </a:stretch>
+        </p:blipFill>
+        <p:spPr bwMode="auto">
+          <a:xfrm>
+            <a:off x="1530626" y="88186"/>
+            <a:ext cx="5824330" cy="4987006"/>
+          </a:xfrm>
+          <a:prstGeom prst="rect">
+            <a:avLst/>
+          </a:prstGeom>
+          <a:noFill/>
+          <a:extLst>
+            <a:ext uri="{909E8E84-426E-40DD-AFC4-6F175D3DCCD1}">
+              <a14:hiddenFill xmlns:a14="http://schemas.microsoft.com/office/drawing/2010/main">
+                <a:solidFill>
+                  <a:srgbClr val="FFFFFF"/>
+                </a:solidFill>
+              </a14:hiddenFill>
+            </a:ext>
+          </a:extLst>
+        </p:spPr>
+      </p:pic>
     </p:spTree>
     <p:extLst>
       <p:ext uri="{BB962C8B-B14F-4D97-AF65-F5344CB8AC3E}">
-        <p14:creationId xmlns:p14="http://schemas.microsoft.com/office/powerpoint/2010/main" val="2094486507"/>
+        <p14:creationId xmlns:p14="http://schemas.microsoft.com/office/powerpoint/2010/main" val="1621025704"/>
       </p:ext>
     </p:extLst>
   </p:cSld>
@@ -8674,7 +8533,97 @@
 </p:sld>
 </file>
 
-<file path=ppt/slides/slide15.xml><?xml version="1.0" encoding="utf-8"?>
+<file path=ppt/slides/slide13.xml><?xml version="1.0" encoding="utf-8"?>
+<p:sld xmlns:a="http://schemas.openxmlformats.org/drawingml/2006/main" xmlns:r="http://schemas.openxmlformats.org/officeDocument/2006/relationships" xmlns:p="http://schemas.openxmlformats.org/presentationml/2006/main">
+  <p:cSld>
+    <p:spTree>
+      <p:nvGrpSpPr>
+        <p:cNvPr id="1" name=""/>
+        <p:cNvGrpSpPr/>
+        <p:nvPr/>
+      </p:nvGrpSpPr>
+      <p:grpSpPr>
+        <a:xfrm>
+          <a:off x="0" y="0"/>
+          <a:ext cx="0" cy="0"/>
+          <a:chOff x="0" y="0"/>
+          <a:chExt cx="0" cy="0"/>
+        </a:xfrm>
+      </p:grpSpPr>
+      <p:sp>
+        <p:nvSpPr>
+          <p:cNvPr id="4" name="제목 3">
+            <a:extLst>
+              <a:ext uri="{FF2B5EF4-FFF2-40B4-BE49-F238E27FC236}">
+                <a16:creationId xmlns:a16="http://schemas.microsoft.com/office/drawing/2014/main" id="{AA6C3C0E-F24F-9763-AC2A-545FB7F3873E}"/>
+              </a:ext>
+            </a:extLst>
+          </p:cNvPr>
+          <p:cNvSpPr>
+            <a:spLocks noGrp="1"/>
+          </p:cNvSpPr>
+          <p:nvPr>
+            <p:ph type="ctrTitle"/>
+          </p:nvPr>
+        </p:nvSpPr>
+        <p:spPr/>
+        <p:txBody>
+          <a:bodyPr/>
+          <a:lstStyle/>
+          <a:p>
+            <a:r>
+              <a:rPr lang="ko-KR" altLang="en-US" dirty="0"/>
+              <a:t>결제 서비스 설계</a:t>
+            </a:r>
+          </a:p>
+        </p:txBody>
+      </p:sp>
+      <p:sp>
+        <p:nvSpPr>
+          <p:cNvPr id="5" name="부제목 4">
+            <a:extLst>
+              <a:ext uri="{FF2B5EF4-FFF2-40B4-BE49-F238E27FC236}">
+                <a16:creationId xmlns:a16="http://schemas.microsoft.com/office/drawing/2014/main" id="{CAF74D28-A379-C9BB-D8F9-E3B6A7427E89}"/>
+              </a:ext>
+            </a:extLst>
+          </p:cNvPr>
+          <p:cNvSpPr>
+            <a:spLocks noGrp="1"/>
+          </p:cNvSpPr>
+          <p:nvPr>
+            <p:ph type="subTitle" idx="1"/>
+          </p:nvPr>
+        </p:nvSpPr>
+        <p:spPr/>
+        <p:txBody>
+          <a:bodyPr/>
+          <a:lstStyle/>
+          <a:p>
+            <a:pPr marL="0" indent="0" algn="r">
+              <a:buNone/>
+            </a:pPr>
+            <a:r>
+              <a:rPr lang="en-US" altLang="ko-KR" dirty="0"/>
+              <a:t>System Design</a:t>
+            </a:r>
+            <a:endParaRPr lang="ko-KR" altLang="en-US" dirty="0"/>
+          </a:p>
+        </p:txBody>
+      </p:sp>
+    </p:spTree>
+    <p:extLst>
+      <p:ext uri="{BB962C8B-B14F-4D97-AF65-F5344CB8AC3E}">
+        <p14:creationId xmlns:p14="http://schemas.microsoft.com/office/powerpoint/2010/main" val="3123472479"/>
+      </p:ext>
+    </p:extLst>
+  </p:cSld>
+  <p:clrMapOvr>
+    <a:masterClrMapping/>
+  </p:clrMapOvr>
+</p:sld>
+</file>
+
+<file path=ppt/slides/slide14.xml><?xml version="1.0" encoding="utf-8"?>
 <p:sld xmlns:a="http://schemas.openxmlformats.org/drawingml/2006/main" xmlns:r="http://schemas.openxmlformats.org/officeDocument/2006/relationships" xmlns:p="http://schemas.openxmlformats.org/presentationml/2006/main">
   <p:cSld>
     <p:spTree>
@@ -8906,6 +8855,218 @@
     <p:extLst>
       <p:ext uri="{BB962C8B-B14F-4D97-AF65-F5344CB8AC3E}">
         <p14:creationId xmlns:p14="http://schemas.microsoft.com/office/powerpoint/2010/main" val="2097981426"/>
+      </p:ext>
+    </p:extLst>
+  </p:cSld>
+  <p:clrMapOvr>
+    <a:masterClrMapping/>
+  </p:clrMapOvr>
+</p:sld>
+</file>
+
+<file path=ppt/slides/slide15.xml><?xml version="1.0" encoding="utf-8"?>
+<p:sld xmlns:a="http://schemas.openxmlformats.org/drawingml/2006/main" xmlns:r="http://schemas.openxmlformats.org/officeDocument/2006/relationships" xmlns:p="http://schemas.openxmlformats.org/presentationml/2006/main">
+  <p:cSld>
+    <p:spTree>
+      <p:nvGrpSpPr>
+        <p:cNvPr id="1" name=""/>
+        <p:cNvGrpSpPr/>
+        <p:nvPr/>
+      </p:nvGrpSpPr>
+      <p:grpSpPr>
+        <a:xfrm>
+          <a:off x="0" y="0"/>
+          <a:ext cx="0" cy="0"/>
+          <a:chOff x="0" y="0"/>
+          <a:chExt cx="0" cy="0"/>
+        </a:xfrm>
+      </p:grpSpPr>
+      <p:sp>
+        <p:nvSpPr>
+          <p:cNvPr id="7" name="Google Shape;209;p30">
+            <a:extLst>
+              <a:ext uri="{FF2B5EF4-FFF2-40B4-BE49-F238E27FC236}">
+                <a16:creationId xmlns:a16="http://schemas.microsoft.com/office/drawing/2014/main" id="{35F3E219-4EBB-8DE8-0966-E4317399395E}"/>
+              </a:ext>
+            </a:extLst>
+          </p:cNvPr>
+          <p:cNvSpPr/>
+          <p:nvPr/>
+        </p:nvSpPr>
+        <p:spPr>
+          <a:xfrm>
+            <a:off x="7811013" y="528014"/>
+            <a:ext cx="952500" cy="298200"/>
+          </a:xfrm>
+          <a:prstGeom prst="rect">
+            <a:avLst/>
+          </a:prstGeom>
+          <a:noFill/>
+          <a:ln>
+            <a:noFill/>
+          </a:ln>
+        </p:spPr>
+        <p:txBody>
+          <a:bodyPr spcFirstLastPara="1" wrap="square" lIns="19050" tIns="19050" rIns="19050" bIns="19050" anchor="t" anchorCtr="0">
+            <a:noAutofit/>
+          </a:bodyPr>
+          <a:lstStyle/>
+          <a:p>
+            <a:pPr marL="63500" marR="0" lvl="1" indent="0" algn="l" rtl="0">
+              <a:lnSpc>
+                <a:spcPct val="90000"/>
+              </a:lnSpc>
+              <a:spcBef>
+                <a:spcPts val="0"/>
+              </a:spcBef>
+              <a:spcAft>
+                <a:spcPts val="0"/>
+              </a:spcAft>
+              <a:buNone/>
+            </a:pPr>
+            <a:r>
+              <a:rPr lang="en-US" altLang="ko" sz="1200" b="1" i="0" u="none" strike="noStrike" cap="none" dirty="0">
+                <a:solidFill>
+                  <a:schemeClr val="bg1"/>
+                </a:solidFill>
+                <a:latin typeface="Arial"/>
+                <a:ea typeface="Arial"/>
+                <a:cs typeface="Arial"/>
+                <a:sym typeface="Arial"/>
+              </a:rPr>
+              <a:t>3</a:t>
+            </a:r>
+            <a:r>
+              <a:rPr lang="ko" sz="1200" b="1" i="0" u="none" strike="noStrike" cap="none" dirty="0">
+                <a:solidFill>
+                  <a:schemeClr val="bg1"/>
+                </a:solidFill>
+                <a:latin typeface="Arial"/>
+                <a:ea typeface="Arial"/>
+                <a:cs typeface="Arial"/>
+                <a:sym typeface="Arial"/>
+              </a:rPr>
+              <a:t>.</a:t>
+            </a:r>
+            <a:endParaRPr sz="500" dirty="0">
+              <a:solidFill>
+                <a:schemeClr val="bg1"/>
+              </a:solidFill>
+            </a:endParaRPr>
+          </a:p>
+        </p:txBody>
+      </p:sp>
+      <p:sp>
+        <p:nvSpPr>
+          <p:cNvPr id="8" name="Google Shape;210;p30">
+            <a:extLst>
+              <a:ext uri="{FF2B5EF4-FFF2-40B4-BE49-F238E27FC236}">
+                <a16:creationId xmlns:a16="http://schemas.microsoft.com/office/drawing/2014/main" id="{8CB63A74-B5C7-DCAA-53F5-96E44004D694}"/>
+              </a:ext>
+            </a:extLst>
+          </p:cNvPr>
+          <p:cNvSpPr/>
+          <p:nvPr/>
+        </p:nvSpPr>
+        <p:spPr>
+          <a:xfrm>
+            <a:off x="7811013" y="825047"/>
+            <a:ext cx="952500" cy="293400"/>
+          </a:xfrm>
+          <a:prstGeom prst="rect">
+            <a:avLst/>
+          </a:prstGeom>
+          <a:noFill/>
+          <a:ln>
+            <a:noFill/>
+          </a:ln>
+        </p:spPr>
+        <p:txBody>
+          <a:bodyPr spcFirstLastPara="1" wrap="square" lIns="19050" tIns="19050" rIns="19050" bIns="19050" anchor="t" anchorCtr="0">
+            <a:noAutofit/>
+          </a:bodyPr>
+          <a:lstStyle/>
+          <a:p>
+            <a:pPr marL="63500" marR="0" lvl="1" indent="0" algn="l" rtl="0">
+              <a:spcBef>
+                <a:spcPts val="200"/>
+              </a:spcBef>
+              <a:spcAft>
+                <a:spcPts val="0"/>
+              </a:spcAft>
+              <a:buClr>
+                <a:srgbClr val="000000"/>
+              </a:buClr>
+              <a:buFont typeface="Arial"/>
+              <a:buNone/>
+            </a:pPr>
+            <a:r>
+              <a:rPr lang="ko-KR" altLang="en-US" sz="800" dirty="0">
+                <a:solidFill>
+                  <a:schemeClr val="bg1"/>
+                </a:solidFill>
+              </a:rPr>
+              <a:t>결제 서비스 설계</a:t>
+            </a:r>
+            <a:endParaRPr sz="800" dirty="0">
+              <a:solidFill>
+                <a:schemeClr val="bg1"/>
+              </a:solidFill>
+            </a:endParaRPr>
+          </a:p>
+        </p:txBody>
+      </p:sp>
+      <p:pic>
+        <p:nvPicPr>
+          <p:cNvPr id="2" name="Picture 2">
+            <a:extLst>
+              <a:ext uri="{FF2B5EF4-FFF2-40B4-BE49-F238E27FC236}">
+                <a16:creationId xmlns:a16="http://schemas.microsoft.com/office/drawing/2014/main" id="{E236BD6B-BC97-99C8-385C-C6780DB2959A}"/>
+              </a:ext>
+            </a:extLst>
+          </p:cNvPr>
+          <p:cNvPicPr>
+            <a:picLocks noChangeAspect="1" noChangeArrowheads="1"/>
+          </p:cNvPicPr>
+          <p:nvPr/>
+        </p:nvPicPr>
+        <p:blipFill>
+          <a:blip r:embed="rId3">
+            <a:extLst>
+              <a:ext uri="{28A0092B-C50C-407E-A947-70E740481C1C}">
+                <a14:useLocalDpi xmlns:a14="http://schemas.microsoft.com/office/drawing/2010/main" val="0"/>
+              </a:ext>
+            </a:extLst>
+          </a:blip>
+          <a:srcRect/>
+          <a:stretch>
+            <a:fillRect/>
+          </a:stretch>
+        </p:blipFill>
+        <p:spPr bwMode="auto">
+          <a:xfrm>
+            <a:off x="2067339" y="45680"/>
+            <a:ext cx="5615402" cy="5012095"/>
+          </a:xfrm>
+          <a:prstGeom prst="rect">
+            <a:avLst/>
+          </a:prstGeom>
+          <a:noFill/>
+          <a:extLst>
+            <a:ext uri="{909E8E84-426E-40DD-AFC4-6F175D3DCCD1}">
+              <a14:hiddenFill xmlns:a14="http://schemas.microsoft.com/office/drawing/2010/main">
+                <a:solidFill>
+                  <a:srgbClr val="FFFFFF"/>
+                </a:solidFill>
+              </a14:hiddenFill>
+            </a:ext>
+          </a:extLst>
+        </p:spPr>
+      </p:pic>
+    </p:spTree>
+    <p:extLst>
+      <p:ext uri="{BB962C8B-B14F-4D97-AF65-F5344CB8AC3E}">
+        <p14:creationId xmlns:p14="http://schemas.microsoft.com/office/powerpoint/2010/main" val="2094486507"/>
       </p:ext>
     </p:extLst>
   </p:cSld>

</xml_diff>